<commit_message>
initial development stage changes
</commit_message>
<xml_diff>
--- a/src/main/resources/static/Driver Onboarding Service.pptx
+++ b/src/main/resources/static/Driver Onboarding Service.pptx
@@ -10,6 +10,7 @@
     <p:sldId id="258" r:id="rId4"/>
     <p:sldId id="260" r:id="rId5"/>
     <p:sldId id="259" r:id="rId6"/>
+    <p:sldId id="261" r:id="rId7"/>
   </p:sldIdLst>
   <p:sldSz cx="12192000" cy="6858000"/>
   <p:notesSz cx="6858000" cy="9144000"/>
@@ -108,6 +109,11 @@
       </a:defRPr>
     </a:lvl9pPr>
   </p:defaultTextStyle>
+  <p:extLst>
+    <p:ext uri="{EFAFB233-063F-42B5-8137-9DF3F51BA10A}">
+      <p15:sldGuideLst xmlns:p15="http://schemas.microsoft.com/office/powerpoint/2012/main"/>
+    </p:ext>
+  </p:extLst>
 </p:presentation>
 </file>
 
@@ -328,7 +334,7 @@
           <a:p>
             <a:fld id="{9AB3A824-1A51-4B26-AD58-A6D8E14F6C04}" type="datetimeFigureOut">
               <a:rPr lang="en-US" dirty="0"/>
-              <a:t>10/15/2023</a:t>
+              <a:t>10/20/2023</a:t>
             </a:fld>
             <a:endParaRPr lang="en-US" dirty="0"/>
           </a:p>
@@ -662,7 +668,7 @@
           <a:p>
             <a:fld id="{D857E33E-8B18-4087-B112-809917729534}" type="datetimeFigureOut">
               <a:rPr lang="en-US" dirty="0"/>
-              <a:t>10/15/2023</a:t>
+              <a:t>10/20/2023</a:t>
             </a:fld>
             <a:endParaRPr lang="en-US" dirty="0"/>
           </a:p>
@@ -964,7 +970,7 @@
           <a:p>
             <a:fld id="{D3FFE419-2371-464F-8239-3959401C3561}" type="datetimeFigureOut">
               <a:rPr lang="en-US" dirty="0"/>
-              <a:t>10/15/2023</a:t>
+              <a:t>10/20/2023</a:t>
             </a:fld>
             <a:endParaRPr lang="en-US" dirty="0"/>
           </a:p>
@@ -1211,7 +1217,7 @@
           <a:p>
             <a:fld id="{97D162C4-EDD9-4389-A98B-B87ECEA2A816}" type="datetimeFigureOut">
               <a:rPr lang="en-US" dirty="0"/>
-              <a:t>10/15/2023</a:t>
+              <a:t>10/20/2023</a:t>
             </a:fld>
             <a:endParaRPr lang="en-US" dirty="0"/>
           </a:p>
@@ -1618,7 +1624,7 @@
           <a:p>
             <a:fld id="{3E5059C3-6A89-4494-99FF-5A4D6FFD50EB}" type="datetimeFigureOut">
               <a:rPr lang="en-US" dirty="0"/>
-              <a:t>10/15/2023</a:t>
+              <a:t>10/20/2023</a:t>
             </a:fld>
             <a:endParaRPr lang="en-US" dirty="0"/>
           </a:p>
@@ -1932,7 +1938,7 @@
           <a:p>
             <a:fld id="{CA954B2F-12DE-47F5-8894-472B206D2E1E}" type="datetimeFigureOut">
               <a:rPr lang="en-US" dirty="0"/>
-              <a:t>10/15/2023</a:t>
+              <a:t>10/20/2023</a:t>
             </a:fld>
             <a:endParaRPr lang="en-US" dirty="0"/>
           </a:p>
@@ -2476,7 +2482,7 @@
           <a:p>
             <a:fld id="{3F30E46F-7819-4ACF-B48B-48222C2ACC88}" type="datetimeFigureOut">
               <a:rPr lang="en-US" dirty="0"/>
-              <a:t>10/15/2023</a:t>
+              <a:t>10/20/2023</a:t>
             </a:fld>
             <a:endParaRPr lang="en-US" dirty="0"/>
           </a:p>
@@ -2671,7 +2677,7 @@
           <a:p>
             <a:fld id="{1FAF3416-4057-4DAA-829D-4CA07428D088}" type="datetimeFigureOut">
               <a:rPr lang="en-US" dirty="0"/>
-              <a:t>10/15/2023</a:t>
+              <a:t>10/20/2023</a:t>
             </a:fld>
             <a:endParaRPr lang="en-US" dirty="0"/>
           </a:p>
@@ -2884,7 +2890,7 @@
           <a:p>
             <a:fld id="{921D9284-D300-4297-87F7-E791DCC15DB1}" type="datetimeFigureOut">
               <a:rPr lang="en-US" dirty="0"/>
-              <a:t>10/15/2023</a:t>
+              <a:t>10/20/2023</a:t>
             </a:fld>
             <a:endParaRPr lang="en-US" dirty="0"/>
           </a:p>
@@ -3253,7 +3259,7 @@
           <a:p>
             <a:fld id="{37D525BB-DA17-4BA0-B3C8-3AC3ABC827E6}" type="datetimeFigureOut">
               <a:rPr lang="en-US" dirty="0"/>
-              <a:t>10/15/2023</a:t>
+              <a:t>10/20/2023</a:t>
             </a:fld>
             <a:endParaRPr lang="en-US" dirty="0"/>
           </a:p>
@@ -3656,7 +3662,7 @@
           <a:p>
             <a:fld id="{B16C4C9A-3960-41CF-A4E9-2A8FB932454B}" type="datetimeFigureOut">
               <a:rPr lang="en-US" dirty="0"/>
-              <a:t>10/15/2023</a:t>
+              <a:t>10/20/2023</a:t>
             </a:fld>
             <a:endParaRPr lang="en-US" dirty="0"/>
           </a:p>
@@ -3967,7 +3973,7 @@
           <a:p>
             <a:fld id="{3CBC1C18-307B-4F68-A007-B5B542270E8D}" type="datetimeFigureOut">
               <a:rPr lang="en-US" dirty="0"/>
-              <a:t>10/15/2023</a:t>
+              <a:t>10/20/2023</a:t>
             </a:fld>
             <a:endParaRPr lang="en-US" dirty="0"/>
           </a:p>
@@ -4859,13 +4865,19 @@
           <a:p>
             <a:r>
               <a:rPr lang="en-IN" dirty="0"/>
-              <a:t>Ride Sharing service is deployed at country level.</a:t>
+              <a:t>A user can onboard with a single vehicle only.</a:t>
             </a:r>
           </a:p>
           <a:p>
             <a:r>
               <a:rPr lang="en-IN" dirty="0"/>
               <a:t>Driver onboarding process, driving document list &amp; vehicle regulation rules are same throughout the country.</a:t>
+            </a:r>
+          </a:p>
+          <a:p>
+            <a:r>
+              <a:rPr lang="en-IN" dirty="0"/>
+              <a:t>User personal details and credentials are stored and managed by another internal module responsible for authentication and authorization.</a:t>
             </a:r>
           </a:p>
           <a:p>
@@ -4969,7 +4981,7 @@
           <a:p>
             <a:r>
               <a:rPr lang="en-IN" dirty="0"/>
-              <a:t>MS SQL Server</a:t>
+              <a:t>SQL Server</a:t>
             </a:r>
           </a:p>
           <a:p>
@@ -4990,6 +5002,98 @@
     <p:extLst>
       <p:ext uri="{BB962C8B-B14F-4D97-AF65-F5344CB8AC3E}">
         <p14:creationId xmlns:p14="http://schemas.microsoft.com/office/powerpoint/2010/main" val="941381599"/>
+      </p:ext>
+    </p:extLst>
+  </p:cSld>
+  <p:clrMapOvr>
+    <a:masterClrMapping/>
+  </p:clrMapOvr>
+</p:sld>
+</file>
+
+<file path=ppt/slides/slide6.xml><?xml version="1.0" encoding="utf-8"?>
+<p:sld xmlns:a="http://schemas.openxmlformats.org/drawingml/2006/main" xmlns:r="http://schemas.openxmlformats.org/officeDocument/2006/relationships" xmlns:p="http://schemas.openxmlformats.org/presentationml/2006/main">
+  <p:cSld>
+    <p:spTree>
+      <p:nvGrpSpPr>
+        <p:cNvPr id="1" name=""/>
+        <p:cNvGrpSpPr/>
+        <p:nvPr/>
+      </p:nvGrpSpPr>
+      <p:grpSpPr>
+        <a:xfrm>
+          <a:off x="0" y="0"/>
+          <a:ext cx="0" cy="0"/>
+          <a:chOff x="0" y="0"/>
+          <a:chExt cx="0" cy="0"/>
+        </a:xfrm>
+      </p:grpSpPr>
+      <p:sp>
+        <p:nvSpPr>
+          <p:cNvPr id="2" name="Title 1">
+            <a:extLst>
+              <a:ext uri="{FF2B5EF4-FFF2-40B4-BE49-F238E27FC236}">
+                <a16:creationId xmlns:a16="http://schemas.microsoft.com/office/drawing/2014/main" id="{8F4B0CBC-AA48-5BF7-6096-E955C30EE9B6}"/>
+              </a:ext>
+            </a:extLst>
+          </p:cNvPr>
+          <p:cNvSpPr>
+            <a:spLocks noGrp="1"/>
+          </p:cNvSpPr>
+          <p:nvPr>
+            <p:ph type="title"/>
+          </p:nvPr>
+        </p:nvSpPr>
+        <p:spPr>
+          <a:xfrm>
+            <a:off x="2306257" y="411485"/>
+            <a:ext cx="7958331" cy="1077229"/>
+          </a:xfrm>
+        </p:spPr>
+        <p:txBody>
+          <a:bodyPr/>
+          <a:lstStyle/>
+          <a:p>
+            <a:r>
+              <a:rPr lang="en-IN" dirty="0"/>
+              <a:t>ER diagram</a:t>
+            </a:r>
+          </a:p>
+        </p:txBody>
+      </p:sp>
+      <p:pic>
+        <p:nvPicPr>
+          <p:cNvPr id="5" name="Content Placeholder 4">
+            <a:extLst>
+              <a:ext uri="{FF2B5EF4-FFF2-40B4-BE49-F238E27FC236}">
+                <a16:creationId xmlns:a16="http://schemas.microsoft.com/office/drawing/2014/main" id="{231ED510-467A-FE42-28B8-A16B84F2577B}"/>
+              </a:ext>
+            </a:extLst>
+          </p:cNvPr>
+          <p:cNvPicPr>
+            <a:picLocks noGrp="1" noChangeAspect="1"/>
+          </p:cNvPicPr>
+          <p:nvPr>
+            <p:ph idx="1"/>
+          </p:nvPr>
+        </p:nvPicPr>
+        <p:blipFill>
+          <a:blip r:embed="rId2"/>
+          <a:stretch>
+            <a:fillRect/>
+          </a:stretch>
+        </p:blipFill>
+        <p:spPr>
+          <a:xfrm>
+            <a:off x="2133600" y="1488714"/>
+            <a:ext cx="8130988" cy="5191801"/>
+          </a:xfrm>
+        </p:spPr>
+      </p:pic>
+    </p:spTree>
+    <p:extLst>
+      <p:ext uri="{BB962C8B-B14F-4D97-AF65-F5344CB8AC3E}">
+        <p14:creationId xmlns:p14="http://schemas.microsoft.com/office/powerpoint/2010/main" val="677511733"/>
       </p:ext>
     </p:extLst>
   </p:cSld>

</xml_diff>